<commit_message>
Competition Teleop and autonomous
</commit_message>
<xml_diff>
--- a/autonomous-points-comparison.pptx
+++ b/autonomous-points-comparison.pptx
@@ -178,8 +178,8 @@
           <c:layoutTarget val="inner"/>
           <c:xMode val="edge"/>
           <c:yMode val="edge"/>
-          <c:x val="6.8833097260604617E-2"/>
-          <c:y val="0.17452983040581466"/>
+          <c:x val="8.3548686757932825E-2"/>
+          <c:y val="0.17750609298837644"/>
           <c:w val="0.90286351706036749"/>
           <c:h val="0.64846860488592772"/>
         </c:manualLayout>
@@ -270,11 +270,11 @@
         </c:dLbls>
         <c:gapWidth val="219"/>
         <c:overlap val="-27"/>
-        <c:axId val="378306992"/>
-        <c:axId val="378309232"/>
+        <c:axId val="154719536"/>
+        <c:axId val="154710576"/>
       </c:barChart>
       <c:catAx>
-        <c:axId val="378306992"/>
+        <c:axId val="154719536"/>
         <c:scaling>
           <c:orientation val="minMax"/>
         </c:scaling>
@@ -317,7 +317,7 @@
             <a:endParaRPr lang="en-US"/>
           </a:p>
         </c:txPr>
-        <c:crossAx val="378309232"/>
+        <c:crossAx val="154710576"/>
         <c:crosses val="autoZero"/>
         <c:auto val="1"/>
         <c:lblAlgn val="ctr"/>
@@ -325,7 +325,7 @@
         <c:noMultiLvlLbl val="0"/>
       </c:catAx>
       <c:valAx>
-        <c:axId val="378309232"/>
+        <c:axId val="154710576"/>
         <c:scaling>
           <c:orientation val="minMax"/>
         </c:scaling>
@@ -376,7 +376,7 @@
             <a:endParaRPr lang="en-US"/>
           </a:p>
         </c:txPr>
-        <c:crossAx val="378306992"/>
+        <c:crossAx val="154719536"/>
         <c:crosses val="autoZero"/>
         <c:crossBetween val="between"/>
       </c:valAx>
@@ -1040,7 +1040,7 @@
           <a:p>
             <a:fld id="{81E89E48-8576-4364-AEE5-8A0B45BFE75A}" type="datetimeFigureOut">
               <a:rPr lang="en-US" smtClean="0"/>
-              <a:t>2/27/2015</a:t>
+              <a:t>3/5/2015</a:t>
             </a:fld>
             <a:endParaRPr lang="en-US"/>
           </a:p>
@@ -1573,7 +1573,7 @@
           <a:p>
             <a:fld id="{E07813E1-1AFB-4AFC-8F16-DB77EBC4F0A6}" type="datetimeFigureOut">
               <a:rPr lang="en-US" smtClean="0"/>
-              <a:t>2/27/2015</a:t>
+              <a:t>3/5/2015</a:t>
             </a:fld>
             <a:endParaRPr lang="en-US"/>
           </a:p>
@@ -1743,7 +1743,7 @@
           <a:p>
             <a:fld id="{E07813E1-1AFB-4AFC-8F16-DB77EBC4F0A6}" type="datetimeFigureOut">
               <a:rPr lang="en-US" smtClean="0"/>
-              <a:t>2/27/2015</a:t>
+              <a:t>3/5/2015</a:t>
             </a:fld>
             <a:endParaRPr lang="en-US"/>
           </a:p>
@@ -1923,7 +1923,7 @@
           <a:p>
             <a:fld id="{E07813E1-1AFB-4AFC-8F16-DB77EBC4F0A6}" type="datetimeFigureOut">
               <a:rPr lang="en-US" smtClean="0"/>
-              <a:t>2/27/2015</a:t>
+              <a:t>3/5/2015</a:t>
             </a:fld>
             <a:endParaRPr lang="en-US"/>
           </a:p>
@@ -2093,7 +2093,7 @@
           <a:p>
             <a:fld id="{E07813E1-1AFB-4AFC-8F16-DB77EBC4F0A6}" type="datetimeFigureOut">
               <a:rPr lang="en-US" smtClean="0"/>
-              <a:t>2/27/2015</a:t>
+              <a:t>3/5/2015</a:t>
             </a:fld>
             <a:endParaRPr lang="en-US"/>
           </a:p>
@@ -2339,7 +2339,7 @@
           <a:p>
             <a:fld id="{E07813E1-1AFB-4AFC-8F16-DB77EBC4F0A6}" type="datetimeFigureOut">
               <a:rPr lang="en-US" smtClean="0"/>
-              <a:t>2/27/2015</a:t>
+              <a:t>3/5/2015</a:t>
             </a:fld>
             <a:endParaRPr lang="en-US"/>
           </a:p>
@@ -2627,7 +2627,7 @@
           <a:p>
             <a:fld id="{E07813E1-1AFB-4AFC-8F16-DB77EBC4F0A6}" type="datetimeFigureOut">
               <a:rPr lang="en-US" smtClean="0"/>
-              <a:t>2/27/2015</a:t>
+              <a:t>3/5/2015</a:t>
             </a:fld>
             <a:endParaRPr lang="en-US"/>
           </a:p>
@@ -3049,7 +3049,7 @@
           <a:p>
             <a:fld id="{E07813E1-1AFB-4AFC-8F16-DB77EBC4F0A6}" type="datetimeFigureOut">
               <a:rPr lang="en-US" smtClean="0"/>
-              <a:t>2/27/2015</a:t>
+              <a:t>3/5/2015</a:t>
             </a:fld>
             <a:endParaRPr lang="en-US"/>
           </a:p>
@@ -3167,7 +3167,7 @@
           <a:p>
             <a:fld id="{E07813E1-1AFB-4AFC-8F16-DB77EBC4F0A6}" type="datetimeFigureOut">
               <a:rPr lang="en-US" smtClean="0"/>
-              <a:t>2/27/2015</a:t>
+              <a:t>3/5/2015</a:t>
             </a:fld>
             <a:endParaRPr lang="en-US"/>
           </a:p>
@@ -3262,7 +3262,7 @@
           <a:p>
             <a:fld id="{E07813E1-1AFB-4AFC-8F16-DB77EBC4F0A6}" type="datetimeFigureOut">
               <a:rPr lang="en-US" smtClean="0"/>
-              <a:t>2/27/2015</a:t>
+              <a:t>3/5/2015</a:t>
             </a:fld>
             <a:endParaRPr lang="en-US"/>
           </a:p>
@@ -3539,7 +3539,7 @@
           <a:p>
             <a:fld id="{E07813E1-1AFB-4AFC-8F16-DB77EBC4F0A6}" type="datetimeFigureOut">
               <a:rPr lang="en-US" smtClean="0"/>
-              <a:t>2/27/2015</a:t>
+              <a:t>3/5/2015</a:t>
             </a:fld>
             <a:endParaRPr lang="en-US"/>
           </a:p>
@@ -3792,7 +3792,7 @@
           <a:p>
             <a:fld id="{E07813E1-1AFB-4AFC-8F16-DB77EBC4F0A6}" type="datetimeFigureOut">
               <a:rPr lang="en-US" smtClean="0"/>
-              <a:t>2/27/2015</a:t>
+              <a:t>3/5/2015</a:t>
             </a:fld>
             <a:endParaRPr lang="en-US"/>
           </a:p>
@@ -4005,7 +4005,7 @@
           <a:p>
             <a:fld id="{E07813E1-1AFB-4AFC-8F16-DB77EBC4F0A6}" type="datetimeFigureOut">
               <a:rPr lang="en-US" smtClean="0"/>
-              <a:t>2/27/2015</a:t>
+              <a:t>3/5/2015</a:t>
             </a:fld>
             <a:endParaRPr lang="en-US"/>
           </a:p>
@@ -12854,15 +12854,7 @@
                   <a:schemeClr val="dk1"/>
                 </a:solidFill>
               </a:rPr>
-              <a:t>Start                           </a:t>
-            </a:r>
-            <a:r>
-              <a:rPr lang="en-US" sz="800" dirty="0" smtClean="0">
-                <a:solidFill>
-                  <a:schemeClr val="dk1"/>
-                </a:solidFill>
-              </a:rPr>
-              <a:t>Stop</a:t>
+              <a:t>Start                           Stop</a:t>
             </a:r>
             <a:endParaRPr lang="en-US" sz="800" dirty="0">
               <a:solidFill>
@@ -16798,13 +16790,13 @@
           <p:nvPr>
             <p:extLst>
               <p:ext uri="{D42A27DB-BD31-4B8C-83A1-F6EECF244321}">
-                <p14:modId xmlns:p14="http://schemas.microsoft.com/office/powerpoint/2010/main" val="1208506946"/>
+                <p14:modId xmlns:p14="http://schemas.microsoft.com/office/powerpoint/2010/main" val="2140142228"/>
               </p:ext>
             </p:extLst>
           </p:nvPr>
         </p:nvGraphicFramePr>
         <p:xfrm>
-          <a:off x="359568" y="3886200"/>
+          <a:off x="359568" y="4648200"/>
           <a:ext cx="6041232" cy="4267200"/>
         </p:xfrm>
         <a:graphic>
@@ -16821,7 +16813,7 @@
         </p:nvSpPr>
         <p:spPr>
           <a:xfrm>
-            <a:off x="1023407" y="4175523"/>
+            <a:off x="646274" y="3781336"/>
             <a:ext cx="5029200" cy="1200329"/>
           </a:xfrm>
           <a:prstGeom prst="rect">

</xml_diff>